<commit_message>
feat: update data and files
</commit_message>
<xml_diff>
--- a/Android data & files.pptx
+++ b/Android data & files.pptx
@@ -11,15 +11,19 @@
     <p:sldId id="259" r:id="rId5"/>
     <p:sldId id="260" r:id="rId6"/>
     <p:sldId id="261" r:id="rId7"/>
-    <p:sldId id="262" r:id="rId8"/>
-    <p:sldId id="263" r:id="rId9"/>
-    <p:sldId id="264" r:id="rId10"/>
-    <p:sldId id="265" r:id="rId11"/>
-    <p:sldId id="266" r:id="rId12"/>
-    <p:sldId id="267" r:id="rId13"/>
-    <p:sldId id="268" r:id="rId14"/>
-    <p:sldId id="269" r:id="rId15"/>
-    <p:sldId id="270" r:id="rId16"/>
+    <p:sldId id="271" r:id="rId8"/>
+    <p:sldId id="262" r:id="rId9"/>
+    <p:sldId id="263" r:id="rId10"/>
+    <p:sldId id="264" r:id="rId11"/>
+    <p:sldId id="265" r:id="rId12"/>
+    <p:sldId id="266" r:id="rId13"/>
+    <p:sldId id="267" r:id="rId14"/>
+    <p:sldId id="272" r:id="rId15"/>
+    <p:sldId id="268" r:id="rId16"/>
+    <p:sldId id="269" r:id="rId17"/>
+    <p:sldId id="273" r:id="rId18"/>
+    <p:sldId id="274" r:id="rId19"/>
+    <p:sldId id="270" r:id="rId20"/>
   </p:sldIdLst>
   <p:sldSz cx="12192000" cy="6858000"/>
   <p:notesSz cx="6858000" cy="9144000"/>
@@ -118,6 +122,11 @@
       </a:defRPr>
     </a:lvl9pPr>
   </p:defaultTextStyle>
+  <p:extLst>
+    <p:ext uri="{EFAFB233-063F-42B5-8137-9DF3F51BA10A}">
+      <p15:sldGuideLst xmlns:p15="http://schemas.microsoft.com/office/powerpoint/2012/main"/>
+    </p:ext>
+  </p:extLst>
 </p:presentation>
 </file>
 
@@ -268,7 +277,7 @@
           <a:p>
             <a:fld id="{3C3C2829-B83E-418A-9598-20B81985D688}" type="datetimeFigureOut">
               <a:rPr lang="zh-CN" altLang="en-US" smtClean="0"/>
-              <a:t>2020/11/15</a:t>
+              <a:t>2020/11/17</a:t>
             </a:fld>
             <a:endParaRPr lang="zh-CN" altLang="en-US"/>
           </a:p>
@@ -466,7 +475,7 @@
           <a:p>
             <a:fld id="{3C3C2829-B83E-418A-9598-20B81985D688}" type="datetimeFigureOut">
               <a:rPr lang="zh-CN" altLang="en-US" smtClean="0"/>
-              <a:t>2020/11/15</a:t>
+              <a:t>2020/11/17</a:t>
             </a:fld>
             <a:endParaRPr lang="zh-CN" altLang="en-US"/>
           </a:p>
@@ -674,7 +683,7 @@
           <a:p>
             <a:fld id="{3C3C2829-B83E-418A-9598-20B81985D688}" type="datetimeFigureOut">
               <a:rPr lang="zh-CN" altLang="en-US" smtClean="0"/>
-              <a:t>2020/11/15</a:t>
+              <a:t>2020/11/17</a:t>
             </a:fld>
             <a:endParaRPr lang="zh-CN" altLang="en-US"/>
           </a:p>
@@ -872,7 +881,7 @@
           <a:p>
             <a:fld id="{3C3C2829-B83E-418A-9598-20B81985D688}" type="datetimeFigureOut">
               <a:rPr lang="zh-CN" altLang="en-US" smtClean="0"/>
-              <a:t>2020/11/15</a:t>
+              <a:t>2020/11/17</a:t>
             </a:fld>
             <a:endParaRPr lang="zh-CN" altLang="en-US"/>
           </a:p>
@@ -1147,7 +1156,7 @@
           <a:p>
             <a:fld id="{3C3C2829-B83E-418A-9598-20B81985D688}" type="datetimeFigureOut">
               <a:rPr lang="zh-CN" altLang="en-US" smtClean="0"/>
-              <a:t>2020/11/15</a:t>
+              <a:t>2020/11/17</a:t>
             </a:fld>
             <a:endParaRPr lang="zh-CN" altLang="en-US"/>
           </a:p>
@@ -1412,7 +1421,7 @@
           <a:p>
             <a:fld id="{3C3C2829-B83E-418A-9598-20B81985D688}" type="datetimeFigureOut">
               <a:rPr lang="zh-CN" altLang="en-US" smtClean="0"/>
-              <a:t>2020/11/15</a:t>
+              <a:t>2020/11/17</a:t>
             </a:fld>
             <a:endParaRPr lang="zh-CN" altLang="en-US"/>
           </a:p>
@@ -1824,7 +1833,7 @@
           <a:p>
             <a:fld id="{3C3C2829-B83E-418A-9598-20B81985D688}" type="datetimeFigureOut">
               <a:rPr lang="zh-CN" altLang="en-US" smtClean="0"/>
-              <a:t>2020/11/15</a:t>
+              <a:t>2020/11/17</a:t>
             </a:fld>
             <a:endParaRPr lang="zh-CN" altLang="en-US"/>
           </a:p>
@@ -1965,7 +1974,7 @@
           <a:p>
             <a:fld id="{3C3C2829-B83E-418A-9598-20B81985D688}" type="datetimeFigureOut">
               <a:rPr lang="zh-CN" altLang="en-US" smtClean="0"/>
-              <a:t>2020/11/15</a:t>
+              <a:t>2020/11/17</a:t>
             </a:fld>
             <a:endParaRPr lang="zh-CN" altLang="en-US"/>
           </a:p>
@@ -2078,7 +2087,7 @@
           <a:p>
             <a:fld id="{3C3C2829-B83E-418A-9598-20B81985D688}" type="datetimeFigureOut">
               <a:rPr lang="zh-CN" altLang="en-US" smtClean="0"/>
-              <a:t>2020/11/15</a:t>
+              <a:t>2020/11/17</a:t>
             </a:fld>
             <a:endParaRPr lang="zh-CN" altLang="en-US"/>
           </a:p>
@@ -2389,7 +2398,7 @@
           <a:p>
             <a:fld id="{3C3C2829-B83E-418A-9598-20B81985D688}" type="datetimeFigureOut">
               <a:rPr lang="zh-CN" altLang="en-US" smtClean="0"/>
-              <a:t>2020/11/15</a:t>
+              <a:t>2020/11/17</a:t>
             </a:fld>
             <a:endParaRPr lang="zh-CN" altLang="en-US"/>
           </a:p>
@@ -2677,7 +2686,7 @@
           <a:p>
             <a:fld id="{3C3C2829-B83E-418A-9598-20B81985D688}" type="datetimeFigureOut">
               <a:rPr lang="zh-CN" altLang="en-US" smtClean="0"/>
-              <a:t>2020/11/15</a:t>
+              <a:t>2020/11/17</a:t>
             </a:fld>
             <a:endParaRPr lang="zh-CN" altLang="en-US"/>
           </a:p>
@@ -2918,7 +2927,7 @@
           <a:p>
             <a:fld id="{3C3C2829-B83E-418A-9598-20B81985D688}" type="datetimeFigureOut">
               <a:rPr lang="zh-CN" altLang="en-US" smtClean="0"/>
-              <a:t>2020/11/15</a:t>
+              <a:t>2020/11/17</a:t>
             </a:fld>
             <a:endParaRPr lang="zh-CN" altLang="en-US"/>
           </a:p>
@@ -3424,6 +3433,160 @@
           <p:cNvPr id="2" name="标题 1">
             <a:extLst>
               <a:ext uri="{FF2B5EF4-FFF2-40B4-BE49-F238E27FC236}">
+                <a16:creationId xmlns:a16="http://schemas.microsoft.com/office/drawing/2014/main" id="{E6288637-6326-44AE-AB70-CAEB2C45315F}"/>
+              </a:ext>
+            </a:extLst>
+          </p:cNvPr>
+          <p:cNvSpPr>
+            <a:spLocks noGrp="1"/>
+          </p:cNvSpPr>
+          <p:nvPr>
+            <p:ph type="title"/>
+          </p:nvPr>
+        </p:nvSpPr>
+        <p:spPr>
+          <a:xfrm>
+            <a:off x="838200" y="365125"/>
+            <a:ext cx="10515600" cy="581359"/>
+          </a:xfrm>
+        </p:spPr>
+        <p:txBody>
+          <a:bodyPr>
+            <a:normAutofit fontScale="90000"/>
+          </a:bodyPr>
+          <a:lstStyle/>
+          <a:p>
+            <a:r>
+              <a:rPr lang="en-US" altLang="zh-CN" dirty="0"/>
+              <a:t>Save key-value data</a:t>
+            </a:r>
+            <a:endParaRPr lang="zh-CN" altLang="en-US" dirty="0"/>
+          </a:p>
+        </p:txBody>
+      </p:sp>
+      <p:sp>
+        <p:nvSpPr>
+          <p:cNvPr id="3" name="内容占位符 2">
+            <a:extLst>
+              <a:ext uri="{FF2B5EF4-FFF2-40B4-BE49-F238E27FC236}">
+                <a16:creationId xmlns:a16="http://schemas.microsoft.com/office/drawing/2014/main" id="{BCAC5A93-DE34-4FF2-9154-CF2613899638}"/>
+              </a:ext>
+            </a:extLst>
+          </p:cNvPr>
+          <p:cNvSpPr>
+            <a:spLocks noGrp="1"/>
+          </p:cNvSpPr>
+          <p:nvPr>
+            <p:ph idx="1"/>
+          </p:nvPr>
+        </p:nvSpPr>
+        <p:spPr/>
+        <p:txBody>
+          <a:bodyPr/>
+          <a:lstStyle/>
+          <a:p>
+            <a:r>
+              <a:rPr lang="en-US" altLang="zh-CN" dirty="0"/>
+              <a:t>If you have a relatively small collection of key-values that you'd like to save, you should use the </a:t>
+            </a:r>
+            <a:r>
+              <a:rPr lang="en-US" altLang="zh-CN" dirty="0" err="1"/>
+              <a:t>SharedPreferences</a:t>
+            </a:r>
+            <a:r>
+              <a:rPr lang="en-US" altLang="zh-CN" dirty="0"/>
+              <a:t> APIs.</a:t>
+            </a:r>
+          </a:p>
+          <a:p>
+            <a:r>
+              <a:rPr lang="en-US" altLang="zh-CN" dirty="0" err="1"/>
+              <a:t>SharedPreferences</a:t>
+            </a:r>
+            <a:r>
+              <a:rPr lang="en-US" altLang="zh-CN" dirty="0"/>
+              <a:t> file can be private?</a:t>
+            </a:r>
+          </a:p>
+          <a:p>
+            <a:r>
+              <a:rPr lang="en-US" altLang="zh-CN" dirty="0"/>
+              <a:t>Is it the same as Preference APIs?</a:t>
+            </a:r>
+            <a:endParaRPr lang="zh-CN" altLang="en-US" dirty="0"/>
+          </a:p>
+        </p:txBody>
+      </p:sp>
+      <p:sp>
+        <p:nvSpPr>
+          <p:cNvPr id="5" name="文本框 4">
+            <a:extLst>
+              <a:ext uri="{FF2B5EF4-FFF2-40B4-BE49-F238E27FC236}">
+                <a16:creationId xmlns:a16="http://schemas.microsoft.com/office/drawing/2014/main" id="{6215AD41-0B79-465E-AD29-0584BDA1784E}"/>
+              </a:ext>
+            </a:extLst>
+          </p:cNvPr>
+          <p:cNvSpPr txBox="1"/>
+          <p:nvPr/>
+        </p:nvSpPr>
+        <p:spPr>
+          <a:xfrm>
+            <a:off x="838200" y="1123138"/>
+            <a:ext cx="10856496" cy="461665"/>
+          </a:xfrm>
+          <a:prstGeom prst="rect">
+            <a:avLst/>
+          </a:prstGeom>
+          <a:noFill/>
+        </p:spPr>
+        <p:txBody>
+          <a:bodyPr wrap="square">
+            <a:spAutoFit/>
+          </a:bodyPr>
+          <a:lstStyle/>
+          <a:p>
+            <a:r>
+              <a:rPr lang="zh-CN" altLang="en-US" sz="2400" dirty="0"/>
+              <a:t>https://developer.android.google.cn/training/data-storage/shared-preferences</a:t>
+            </a:r>
+          </a:p>
+        </p:txBody>
+      </p:sp>
+    </p:spTree>
+    <p:extLst>
+      <p:ext uri="{BB962C8B-B14F-4D97-AF65-F5344CB8AC3E}">
+        <p14:creationId xmlns:p14="http://schemas.microsoft.com/office/powerpoint/2010/main" val="1002890248"/>
+      </p:ext>
+    </p:extLst>
+  </p:cSld>
+  <p:clrMapOvr>
+    <a:masterClrMapping/>
+  </p:clrMapOvr>
+</p:sld>
+</file>
+
+<file path=ppt/slides/slide11.xml><?xml version="1.0" encoding="utf-8"?>
+<p:sld xmlns:a="http://schemas.openxmlformats.org/drawingml/2006/main" xmlns:r="http://schemas.openxmlformats.org/officeDocument/2006/relationships" xmlns:p="http://schemas.openxmlformats.org/presentationml/2006/main">
+  <p:cSld>
+    <p:spTree>
+      <p:nvGrpSpPr>
+        <p:cNvPr id="1" name=""/>
+        <p:cNvGrpSpPr/>
+        <p:nvPr/>
+      </p:nvGrpSpPr>
+      <p:grpSpPr>
+        <a:xfrm>
+          <a:off x="0" y="0"/>
+          <a:ext cx="0" cy="0"/>
+          <a:chOff x="0" y="0"/>
+          <a:chExt cx="0" cy="0"/>
+        </a:xfrm>
+      </p:grpSpPr>
+      <p:sp>
+        <p:nvSpPr>
+          <p:cNvPr id="2" name="标题 1">
+            <a:extLst>
+              <a:ext uri="{FF2B5EF4-FFF2-40B4-BE49-F238E27FC236}">
                 <a16:creationId xmlns:a16="http://schemas.microsoft.com/office/drawing/2014/main" id="{61043633-1998-4376-8DBC-7F165DB93E22}"/>
               </a:ext>
             </a:extLst>
@@ -3522,7 +3685,7 @@
 </p:sld>
 </file>
 
-<file path=ppt/slides/slide11.xml><?xml version="1.0" encoding="utf-8"?>
+<file path=ppt/slides/slide12.xml><?xml version="1.0" encoding="utf-8"?>
 <p:sld xmlns:a="http://schemas.openxmlformats.org/drawingml/2006/main" xmlns:r="http://schemas.openxmlformats.org/officeDocument/2006/relationships" xmlns:p="http://schemas.openxmlformats.org/presentationml/2006/main">
   <p:cSld>
     <p:spTree>
@@ -3925,7 +4088,7 @@
 </p:sld>
 </file>
 
-<file path=ppt/slides/slide12.xml><?xml version="1.0" encoding="utf-8"?>
+<file path=ppt/slides/slide13.xml><?xml version="1.0" encoding="utf-8"?>
 <p:sld xmlns:a="http://schemas.openxmlformats.org/drawingml/2006/main" xmlns:r="http://schemas.openxmlformats.org/officeDocument/2006/relationships" xmlns:p="http://schemas.openxmlformats.org/presentationml/2006/main">
   <p:cSld>
     <p:spTree>
@@ -4276,86 +4439,6 @@
 </p:sld>
 </file>
 
-<file path=ppt/slides/slide13.xml><?xml version="1.0" encoding="utf-8"?>
-<p:sld xmlns:a="http://schemas.openxmlformats.org/drawingml/2006/main" xmlns:r="http://schemas.openxmlformats.org/officeDocument/2006/relationships" xmlns:p="http://schemas.openxmlformats.org/presentationml/2006/main">
-  <p:cSld>
-    <p:spTree>
-      <p:nvGrpSpPr>
-        <p:cNvPr id="1" name=""/>
-        <p:cNvGrpSpPr/>
-        <p:nvPr/>
-      </p:nvGrpSpPr>
-      <p:grpSpPr>
-        <a:xfrm>
-          <a:off x="0" y="0"/>
-          <a:ext cx="0" cy="0"/>
-          <a:chOff x="0" y="0"/>
-          <a:chExt cx="0" cy="0"/>
-        </a:xfrm>
-      </p:grpSpPr>
-      <p:sp>
-        <p:nvSpPr>
-          <p:cNvPr id="2" name="标题 1">
-            <a:extLst>
-              <a:ext uri="{FF2B5EF4-FFF2-40B4-BE49-F238E27FC236}">
-                <a16:creationId xmlns:a16="http://schemas.microsoft.com/office/drawing/2014/main" id="{8875BE9B-5D03-4C8B-8D7B-8B5659846FAA}"/>
-              </a:ext>
-            </a:extLst>
-          </p:cNvPr>
-          <p:cNvSpPr>
-            <a:spLocks noGrp="1"/>
-          </p:cNvSpPr>
-          <p:nvPr>
-            <p:ph type="title"/>
-          </p:nvPr>
-        </p:nvSpPr>
-        <p:spPr/>
-        <p:txBody>
-          <a:bodyPr/>
-          <a:lstStyle/>
-          <a:p>
-            <a:endParaRPr lang="zh-CN" altLang="en-US"/>
-          </a:p>
-        </p:txBody>
-      </p:sp>
-      <p:sp>
-        <p:nvSpPr>
-          <p:cNvPr id="3" name="内容占位符 2">
-            <a:extLst>
-              <a:ext uri="{FF2B5EF4-FFF2-40B4-BE49-F238E27FC236}">
-                <a16:creationId xmlns:a16="http://schemas.microsoft.com/office/drawing/2014/main" id="{96E95414-DF62-4B07-9E5A-95CF534CB682}"/>
-              </a:ext>
-            </a:extLst>
-          </p:cNvPr>
-          <p:cNvSpPr>
-            <a:spLocks noGrp="1"/>
-          </p:cNvSpPr>
-          <p:nvPr>
-            <p:ph idx="1"/>
-          </p:nvPr>
-        </p:nvSpPr>
-        <p:spPr/>
-        <p:txBody>
-          <a:bodyPr/>
-          <a:lstStyle/>
-          <a:p>
-            <a:endParaRPr lang="zh-CN" altLang="en-US"/>
-          </a:p>
-        </p:txBody>
-      </p:sp>
-    </p:spTree>
-    <p:extLst>
-      <p:ext uri="{BB962C8B-B14F-4D97-AF65-F5344CB8AC3E}">
-        <p14:creationId xmlns:p14="http://schemas.microsoft.com/office/powerpoint/2010/main" val="3477924458"/>
-      </p:ext>
-    </p:extLst>
-  </p:cSld>
-  <p:clrMapOvr>
-    <a:masterClrMapping/>
-  </p:clrMapOvr>
-</p:sld>
-</file>
-
 <file path=ppt/slides/slide14.xml><?xml version="1.0" encoding="utf-8"?>
 <p:sld xmlns:a="http://schemas.openxmlformats.org/drawingml/2006/main" xmlns:r="http://schemas.openxmlformats.org/officeDocument/2006/relationships" xmlns:p="http://schemas.openxmlformats.org/presentationml/2006/main">
   <p:cSld>
@@ -4378,7 +4461,7 @@
           <p:cNvPr id="2" name="标题 1">
             <a:extLst>
               <a:ext uri="{FF2B5EF4-FFF2-40B4-BE49-F238E27FC236}">
-                <a16:creationId xmlns:a16="http://schemas.microsoft.com/office/drawing/2014/main" id="{A8E658F6-7CC1-4070-A601-F8BD5C28F8A6}"/>
+                <a16:creationId xmlns:a16="http://schemas.microsoft.com/office/drawing/2014/main" id="{26FC3646-5D06-448D-AAFC-CBEC5B3F1985}"/>
               </a:ext>
             </a:extLst>
           </p:cNvPr>
@@ -4394,7 +4477,11 @@
           <a:bodyPr/>
           <a:lstStyle/>
           <a:p>
-            <a:endParaRPr lang="zh-CN" altLang="en-US"/>
+            <a:r>
+              <a:rPr lang="en-US" altLang="zh-CN" dirty="0"/>
+              <a:t>File path in the device</a:t>
+            </a:r>
+            <a:endParaRPr lang="zh-CN" altLang="en-US" dirty="0"/>
           </a:p>
         </p:txBody>
       </p:sp>
@@ -4403,7 +4490,7 @@
           <p:cNvPr id="3" name="内容占位符 2">
             <a:extLst>
               <a:ext uri="{FF2B5EF4-FFF2-40B4-BE49-F238E27FC236}">
-                <a16:creationId xmlns:a16="http://schemas.microsoft.com/office/drawing/2014/main" id="{B82E2A25-FA9F-40FC-9EEB-F15513CF08E7}"/>
+                <a16:creationId xmlns:a16="http://schemas.microsoft.com/office/drawing/2014/main" id="{A7CC205C-8EE6-4253-8E15-23F9C413D2E3}"/>
               </a:ext>
             </a:extLst>
           </p:cNvPr>
@@ -4419,14 +4506,24 @@
           <a:bodyPr/>
           <a:lstStyle/>
           <a:p>
-            <a:endParaRPr lang="zh-CN" altLang="en-US"/>
+            <a:r>
+              <a:rPr lang="en-US" altLang="zh-CN" dirty="0"/>
+              <a:t>Read Page 269</a:t>
+            </a:r>
+          </a:p>
+          <a:p>
+            <a:r>
+              <a:rPr lang="en-US" altLang="zh-CN" dirty="0"/>
+              <a:t>Where to find the shared-preferences files? </a:t>
+            </a:r>
+            <a:endParaRPr lang="zh-CN" altLang="en-US" dirty="0"/>
           </a:p>
         </p:txBody>
       </p:sp>
     </p:spTree>
     <p:extLst>
       <p:ext uri="{BB962C8B-B14F-4D97-AF65-F5344CB8AC3E}">
-        <p14:creationId xmlns:p14="http://schemas.microsoft.com/office/powerpoint/2010/main" val="1311193855"/>
+        <p14:creationId xmlns:p14="http://schemas.microsoft.com/office/powerpoint/2010/main" val="3755143017"/>
       </p:ext>
     </p:extLst>
   </p:cSld>
@@ -4458,6 +4555,567 @@
           <p:cNvPr id="2" name="标题 1">
             <a:extLst>
               <a:ext uri="{FF2B5EF4-FFF2-40B4-BE49-F238E27FC236}">
+                <a16:creationId xmlns:a16="http://schemas.microsoft.com/office/drawing/2014/main" id="{8875BE9B-5D03-4C8B-8D7B-8B5659846FAA}"/>
+              </a:ext>
+            </a:extLst>
+          </p:cNvPr>
+          <p:cNvSpPr>
+            <a:spLocks noGrp="1"/>
+          </p:cNvSpPr>
+          <p:nvPr>
+            <p:ph type="title"/>
+          </p:nvPr>
+        </p:nvSpPr>
+        <p:spPr/>
+        <p:txBody>
+          <a:bodyPr/>
+          <a:lstStyle/>
+          <a:p>
+            <a:r>
+              <a:rPr lang="en-US" altLang="zh-CN" b="1" dirty="0">
+                <a:latin typeface="Roboto"/>
+              </a:rPr>
+              <a:t>L</a:t>
+            </a:r>
+            <a:r>
+              <a:rPr lang="en-US" altLang="zh-CN" b="1" i="0" dirty="0">
+                <a:effectLst/>
+                <a:latin typeface="Roboto"/>
+              </a:rPr>
+              <a:t>ocal database</a:t>
+            </a:r>
+            <a:endParaRPr lang="zh-CN" altLang="en-US" dirty="0"/>
+          </a:p>
+        </p:txBody>
+      </p:sp>
+      <p:sp>
+        <p:nvSpPr>
+          <p:cNvPr id="3" name="内容占位符 2">
+            <a:extLst>
+              <a:ext uri="{FF2B5EF4-FFF2-40B4-BE49-F238E27FC236}">
+                <a16:creationId xmlns:a16="http://schemas.microsoft.com/office/drawing/2014/main" id="{96E95414-DF62-4B07-9E5A-95CF534CB682}"/>
+              </a:ext>
+            </a:extLst>
+          </p:cNvPr>
+          <p:cNvSpPr>
+            <a:spLocks noGrp="1"/>
+          </p:cNvSpPr>
+          <p:nvPr>
+            <p:ph idx="1"/>
+          </p:nvPr>
+        </p:nvSpPr>
+        <p:spPr/>
+        <p:txBody>
+          <a:bodyPr>
+            <a:normAutofit/>
+          </a:bodyPr>
+          <a:lstStyle/>
+          <a:p>
+            <a:r>
+              <a:rPr lang="en-US" altLang="zh-CN" sz="3600" dirty="0"/>
+              <a:t>SQLite</a:t>
+            </a:r>
+          </a:p>
+          <a:p>
+            <a:r>
+              <a:rPr lang="en-US" altLang="zh-CN" sz="3600" dirty="0"/>
+              <a:t>Save data using SQLite</a:t>
+            </a:r>
+          </a:p>
+          <a:p>
+            <a:r>
+              <a:rPr lang="en-US" altLang="zh-CN" sz="3600" dirty="0"/>
+              <a:t>Save data in a local database using Room</a:t>
+            </a:r>
+          </a:p>
+          <a:p>
+            <a:endParaRPr lang="zh-CN" altLang="en-US" sz="3600" dirty="0"/>
+          </a:p>
+        </p:txBody>
+      </p:sp>
+    </p:spTree>
+    <p:extLst>
+      <p:ext uri="{BB962C8B-B14F-4D97-AF65-F5344CB8AC3E}">
+        <p14:creationId xmlns:p14="http://schemas.microsoft.com/office/powerpoint/2010/main" val="3477924458"/>
+      </p:ext>
+    </p:extLst>
+  </p:cSld>
+  <p:clrMapOvr>
+    <a:masterClrMapping/>
+  </p:clrMapOvr>
+</p:sld>
+</file>
+
+<file path=ppt/slides/slide16.xml><?xml version="1.0" encoding="utf-8"?>
+<p:sld xmlns:a="http://schemas.openxmlformats.org/drawingml/2006/main" xmlns:r="http://schemas.openxmlformats.org/officeDocument/2006/relationships" xmlns:p="http://schemas.openxmlformats.org/presentationml/2006/main">
+  <p:cSld>
+    <p:spTree>
+      <p:nvGrpSpPr>
+        <p:cNvPr id="1" name=""/>
+        <p:cNvGrpSpPr/>
+        <p:nvPr/>
+      </p:nvGrpSpPr>
+      <p:grpSpPr>
+        <a:xfrm>
+          <a:off x="0" y="0"/>
+          <a:ext cx="0" cy="0"/>
+          <a:chOff x="0" y="0"/>
+          <a:chExt cx="0" cy="0"/>
+        </a:xfrm>
+      </p:grpSpPr>
+      <p:sp>
+        <p:nvSpPr>
+          <p:cNvPr id="2" name="标题 1">
+            <a:extLst>
+              <a:ext uri="{FF2B5EF4-FFF2-40B4-BE49-F238E27FC236}">
+                <a16:creationId xmlns:a16="http://schemas.microsoft.com/office/drawing/2014/main" id="{A8E658F6-7CC1-4070-A601-F8BD5C28F8A6}"/>
+              </a:ext>
+            </a:extLst>
+          </p:cNvPr>
+          <p:cNvSpPr>
+            <a:spLocks noGrp="1"/>
+          </p:cNvSpPr>
+          <p:nvPr>
+            <p:ph type="title"/>
+          </p:nvPr>
+        </p:nvSpPr>
+        <p:spPr/>
+        <p:txBody>
+          <a:bodyPr/>
+          <a:lstStyle/>
+          <a:p>
+            <a:r>
+              <a:rPr lang="en-US" altLang="zh-CN" sz="4400" dirty="0"/>
+              <a:t>SQLite</a:t>
+            </a:r>
+            <a:endParaRPr lang="zh-CN" altLang="en-US" dirty="0"/>
+          </a:p>
+        </p:txBody>
+      </p:sp>
+      <p:sp>
+        <p:nvSpPr>
+          <p:cNvPr id="3" name="内容占位符 2">
+            <a:extLst>
+              <a:ext uri="{FF2B5EF4-FFF2-40B4-BE49-F238E27FC236}">
+                <a16:creationId xmlns:a16="http://schemas.microsoft.com/office/drawing/2014/main" id="{B82E2A25-FA9F-40FC-9EEB-F15513CF08E7}"/>
+              </a:ext>
+            </a:extLst>
+          </p:cNvPr>
+          <p:cNvSpPr>
+            <a:spLocks noGrp="1"/>
+          </p:cNvSpPr>
+          <p:nvPr>
+            <p:ph idx="1"/>
+          </p:nvPr>
+        </p:nvSpPr>
+        <p:spPr/>
+        <p:txBody>
+          <a:bodyPr>
+            <a:normAutofit/>
+          </a:bodyPr>
+          <a:lstStyle/>
+          <a:p>
+            <a:r>
+              <a:rPr lang="en-US" altLang="zh-CN" sz="3200" dirty="0"/>
+              <a:t>SQLite is a C-language library that implements a small, fast, self-contained, high-reliability, full-featured, SQL database engine. </a:t>
+            </a:r>
+          </a:p>
+          <a:p>
+            <a:r>
+              <a:rPr lang="en-US" altLang="zh-CN" sz="3200" dirty="0"/>
+              <a:t>SQLite is the most used database engine in the world. </a:t>
+            </a:r>
+          </a:p>
+          <a:p>
+            <a:r>
+              <a:rPr lang="en-US" altLang="zh-CN" sz="3200" dirty="0"/>
+              <a:t>The SQLite file format is stable, cross-platform, and backwards compatible and the developers pledge to keep it that way through </a:t>
+            </a:r>
+            <a:r>
+              <a:rPr lang="en-US" altLang="zh-CN" sz="3200" b="1" i="1" dirty="0">
+                <a:solidFill>
+                  <a:srgbClr val="FF0000"/>
+                </a:solidFill>
+              </a:rPr>
+              <a:t>at least the year 2050</a:t>
+            </a:r>
+            <a:r>
+              <a:rPr lang="en-US" altLang="zh-CN" sz="3200" dirty="0"/>
+              <a:t>.</a:t>
+            </a:r>
+            <a:endParaRPr lang="zh-CN" altLang="en-US" sz="3200" dirty="0"/>
+          </a:p>
+        </p:txBody>
+      </p:sp>
+      <p:pic>
+        <p:nvPicPr>
+          <p:cNvPr id="7" name="图片 6">
+            <a:extLst>
+              <a:ext uri="{FF2B5EF4-FFF2-40B4-BE49-F238E27FC236}">
+                <a16:creationId xmlns:a16="http://schemas.microsoft.com/office/drawing/2014/main" id="{0CAC877D-8F68-4676-A201-1C5614D5F381}"/>
+              </a:ext>
+            </a:extLst>
+          </p:cNvPr>
+          <p:cNvPicPr>
+            <a:picLocks noChangeAspect="1"/>
+          </p:cNvPicPr>
+          <p:nvPr/>
+        </p:nvPicPr>
+        <p:blipFill>
+          <a:blip r:embed="rId2">
+            <a:extLst>
+              <a:ext uri="{28A0092B-C50C-407E-A947-70E740481C1C}">
+                <a14:useLocalDpi xmlns:a14="http://schemas.microsoft.com/office/drawing/2010/main" val="0"/>
+              </a:ext>
+            </a:extLst>
+          </a:blip>
+          <a:stretch>
+            <a:fillRect/>
+          </a:stretch>
+        </p:blipFill>
+        <p:spPr>
+          <a:xfrm>
+            <a:off x="8389398" y="0"/>
+            <a:ext cx="3660560" cy="1680530"/>
+          </a:xfrm>
+          <a:prstGeom prst="rect">
+            <a:avLst/>
+          </a:prstGeom>
+        </p:spPr>
+      </p:pic>
+    </p:spTree>
+    <p:extLst>
+      <p:ext uri="{BB962C8B-B14F-4D97-AF65-F5344CB8AC3E}">
+        <p14:creationId xmlns:p14="http://schemas.microsoft.com/office/powerpoint/2010/main" val="1311193855"/>
+      </p:ext>
+    </p:extLst>
+  </p:cSld>
+  <p:clrMapOvr>
+    <a:masterClrMapping/>
+  </p:clrMapOvr>
+</p:sld>
+</file>
+
+<file path=ppt/slides/slide17.xml><?xml version="1.0" encoding="utf-8"?>
+<p:sld xmlns:a="http://schemas.openxmlformats.org/drawingml/2006/main" xmlns:r="http://schemas.openxmlformats.org/officeDocument/2006/relationships" xmlns:p="http://schemas.openxmlformats.org/presentationml/2006/main">
+  <p:cSld>
+    <p:spTree>
+      <p:nvGrpSpPr>
+        <p:cNvPr id="1" name=""/>
+        <p:cNvGrpSpPr/>
+        <p:nvPr/>
+      </p:nvGrpSpPr>
+      <p:grpSpPr>
+        <a:xfrm>
+          <a:off x="0" y="0"/>
+          <a:ext cx="0" cy="0"/>
+          <a:chOff x="0" y="0"/>
+          <a:chExt cx="0" cy="0"/>
+        </a:xfrm>
+      </p:grpSpPr>
+      <p:sp>
+        <p:nvSpPr>
+          <p:cNvPr id="2" name="标题 1">
+            <a:extLst>
+              <a:ext uri="{FF2B5EF4-FFF2-40B4-BE49-F238E27FC236}">
+                <a16:creationId xmlns:a16="http://schemas.microsoft.com/office/drawing/2014/main" id="{B1BD32BF-98B1-4646-8379-FD5AF73DA1E5}"/>
+              </a:ext>
+            </a:extLst>
+          </p:cNvPr>
+          <p:cNvSpPr>
+            <a:spLocks noGrp="1"/>
+          </p:cNvSpPr>
+          <p:nvPr>
+            <p:ph type="title"/>
+          </p:nvPr>
+        </p:nvSpPr>
+        <p:spPr/>
+        <p:txBody>
+          <a:bodyPr/>
+          <a:lstStyle/>
+          <a:p>
+            <a:r>
+              <a:rPr lang="en-US" altLang="zh-CN" sz="4400" dirty="0"/>
+              <a:t>Save data using SQLite</a:t>
+            </a:r>
+            <a:endParaRPr lang="zh-CN" altLang="en-US" dirty="0"/>
+          </a:p>
+        </p:txBody>
+      </p:sp>
+      <p:sp>
+        <p:nvSpPr>
+          <p:cNvPr id="3" name="内容占位符 2">
+            <a:extLst>
+              <a:ext uri="{FF2B5EF4-FFF2-40B4-BE49-F238E27FC236}">
+                <a16:creationId xmlns:a16="http://schemas.microsoft.com/office/drawing/2014/main" id="{D3718D10-A9F2-4A3C-9661-31BA1A8D20E6}"/>
+              </a:ext>
+            </a:extLst>
+          </p:cNvPr>
+          <p:cNvSpPr>
+            <a:spLocks noGrp="1"/>
+          </p:cNvSpPr>
+          <p:nvPr>
+            <p:ph idx="1"/>
+          </p:nvPr>
+        </p:nvSpPr>
+        <p:spPr/>
+        <p:txBody>
+          <a:bodyPr/>
+          <a:lstStyle/>
+          <a:p>
+            <a:r>
+              <a:rPr lang="en-US" altLang="zh-CN" dirty="0"/>
+              <a:t>Read Page 278</a:t>
+            </a:r>
+          </a:p>
+          <a:p>
+            <a:r>
+              <a:rPr lang="en-US" altLang="zh-CN" dirty="0"/>
+              <a:t>What are operations of </a:t>
+            </a:r>
+            <a:r>
+              <a:rPr lang="en-US" altLang="zh-CN" sz="2800" dirty="0"/>
+              <a:t>SQLite can we do?</a:t>
+            </a:r>
+            <a:endParaRPr lang="zh-CN" altLang="en-US" dirty="0"/>
+          </a:p>
+        </p:txBody>
+      </p:sp>
+    </p:spTree>
+    <p:extLst>
+      <p:ext uri="{BB962C8B-B14F-4D97-AF65-F5344CB8AC3E}">
+        <p14:creationId xmlns:p14="http://schemas.microsoft.com/office/powerpoint/2010/main" val="769654133"/>
+      </p:ext>
+    </p:extLst>
+  </p:cSld>
+  <p:clrMapOvr>
+    <a:masterClrMapping/>
+  </p:clrMapOvr>
+</p:sld>
+</file>
+
+<file path=ppt/slides/slide18.xml><?xml version="1.0" encoding="utf-8"?>
+<p:sld xmlns:a="http://schemas.openxmlformats.org/drawingml/2006/main" xmlns:r="http://schemas.openxmlformats.org/officeDocument/2006/relationships" xmlns:p="http://schemas.openxmlformats.org/presentationml/2006/main">
+  <p:cSld>
+    <p:spTree>
+      <p:nvGrpSpPr>
+        <p:cNvPr id="1" name=""/>
+        <p:cNvGrpSpPr/>
+        <p:nvPr/>
+      </p:nvGrpSpPr>
+      <p:grpSpPr>
+        <a:xfrm>
+          <a:off x="0" y="0"/>
+          <a:ext cx="0" cy="0"/>
+          <a:chOff x="0" y="0"/>
+          <a:chExt cx="0" cy="0"/>
+        </a:xfrm>
+      </p:grpSpPr>
+      <p:sp>
+        <p:nvSpPr>
+          <p:cNvPr id="2" name="标题 1">
+            <a:extLst>
+              <a:ext uri="{FF2B5EF4-FFF2-40B4-BE49-F238E27FC236}">
+                <a16:creationId xmlns:a16="http://schemas.microsoft.com/office/drawing/2014/main" id="{C3F1A65B-9FB6-4C58-93D9-2AF81B022E7A}"/>
+              </a:ext>
+            </a:extLst>
+          </p:cNvPr>
+          <p:cNvSpPr>
+            <a:spLocks noGrp="1"/>
+          </p:cNvSpPr>
+          <p:nvPr>
+            <p:ph type="title"/>
+          </p:nvPr>
+        </p:nvSpPr>
+        <p:spPr>
+          <a:xfrm>
+            <a:off x="838200" y="72162"/>
+            <a:ext cx="10515600" cy="646929"/>
+          </a:xfrm>
+        </p:spPr>
+        <p:txBody>
+          <a:bodyPr>
+            <a:normAutofit fontScale="90000"/>
+          </a:bodyPr>
+          <a:lstStyle/>
+          <a:p>
+            <a:r>
+              <a:rPr lang="en-US" altLang="zh-CN" sz="4400" dirty="0"/>
+              <a:t>Save data in a local database using Room</a:t>
+            </a:r>
+            <a:endParaRPr lang="zh-CN" altLang="en-US" dirty="0"/>
+          </a:p>
+        </p:txBody>
+      </p:sp>
+      <p:sp>
+        <p:nvSpPr>
+          <p:cNvPr id="3" name="内容占位符 2">
+            <a:extLst>
+              <a:ext uri="{FF2B5EF4-FFF2-40B4-BE49-F238E27FC236}">
+                <a16:creationId xmlns:a16="http://schemas.microsoft.com/office/drawing/2014/main" id="{FF2D1A38-5009-4109-9D59-8E9AF852C9F3}"/>
+              </a:ext>
+            </a:extLst>
+          </p:cNvPr>
+          <p:cNvSpPr>
+            <a:spLocks noGrp="1"/>
+          </p:cNvSpPr>
+          <p:nvPr>
+            <p:ph idx="1"/>
+          </p:nvPr>
+        </p:nvSpPr>
+        <p:spPr>
+          <a:xfrm>
+            <a:off x="838200" y="719091"/>
+            <a:ext cx="10515600" cy="1077218"/>
+          </a:xfrm>
+        </p:spPr>
+        <p:txBody>
+          <a:bodyPr/>
+          <a:lstStyle/>
+          <a:p>
+            <a:r>
+              <a:rPr lang="en-US" altLang="zh-CN" dirty="0"/>
+              <a:t>Ref site: </a:t>
+            </a:r>
+            <a:r>
+              <a:rPr lang="en-US" altLang="zh-CN" dirty="0">
+                <a:hlinkClick r:id="rId2"/>
+              </a:rPr>
+              <a:t>https://developer.android.google.cn/training/data-storage/room</a:t>
+            </a:r>
+            <a:endParaRPr lang="en-US" altLang="zh-CN" dirty="0"/>
+          </a:p>
+          <a:p>
+            <a:endParaRPr lang="zh-CN" altLang="en-US" dirty="0"/>
+          </a:p>
+        </p:txBody>
+      </p:sp>
+      <p:pic>
+        <p:nvPicPr>
+          <p:cNvPr id="5" name="图片 4">
+            <a:extLst>
+              <a:ext uri="{FF2B5EF4-FFF2-40B4-BE49-F238E27FC236}">
+                <a16:creationId xmlns:a16="http://schemas.microsoft.com/office/drawing/2014/main" id="{72D88A8F-530F-419C-87BA-A2C9190109AC}"/>
+              </a:ext>
+            </a:extLst>
+          </p:cNvPr>
+          <p:cNvPicPr>
+            <a:picLocks noChangeAspect="1"/>
+          </p:cNvPicPr>
+          <p:nvPr/>
+        </p:nvPicPr>
+        <p:blipFill>
+          <a:blip r:embed="rId3">
+            <a:extLst>
+              <a:ext uri="{28A0092B-C50C-407E-A947-70E740481C1C}">
+                <a14:useLocalDpi xmlns:a14="http://schemas.microsoft.com/office/drawing/2010/main" val="0"/>
+              </a:ext>
+            </a:extLst>
+          </a:blip>
+          <a:stretch>
+            <a:fillRect/>
+          </a:stretch>
+        </p:blipFill>
+        <p:spPr>
+          <a:xfrm>
+            <a:off x="5040666" y="1295955"/>
+            <a:ext cx="6077361" cy="5489883"/>
+          </a:xfrm>
+          <a:prstGeom prst="rect">
+            <a:avLst/>
+          </a:prstGeom>
+        </p:spPr>
+      </p:pic>
+      <p:sp>
+        <p:nvSpPr>
+          <p:cNvPr id="7" name="文本框 6">
+            <a:extLst>
+              <a:ext uri="{FF2B5EF4-FFF2-40B4-BE49-F238E27FC236}">
+                <a16:creationId xmlns:a16="http://schemas.microsoft.com/office/drawing/2014/main" id="{65903917-60DD-4DD7-A3A6-05291EDDAF60}"/>
+              </a:ext>
+            </a:extLst>
+          </p:cNvPr>
+          <p:cNvSpPr txBox="1"/>
+          <p:nvPr/>
+        </p:nvSpPr>
+        <p:spPr>
+          <a:xfrm>
+            <a:off x="233037" y="3213855"/>
+            <a:ext cx="4638953" cy="1077218"/>
+          </a:xfrm>
+          <a:prstGeom prst="rect">
+            <a:avLst/>
+          </a:prstGeom>
+          <a:noFill/>
+        </p:spPr>
+        <p:txBody>
+          <a:bodyPr wrap="square">
+            <a:spAutoFit/>
+          </a:bodyPr>
+          <a:lstStyle/>
+          <a:p>
+            <a:pPr marL="457200" indent="-457200">
+              <a:buFont typeface="Arial" panose="020B0604020202020204" pitchFamily="34" charset="0"/>
+              <a:buChar char="•"/>
+            </a:pPr>
+            <a:r>
+              <a:rPr lang="en-US" altLang="zh-CN" sz="3200" dirty="0">
+                <a:solidFill>
+                  <a:srgbClr val="202124"/>
+                </a:solidFill>
+                <a:latin typeface="Roboto"/>
+              </a:rPr>
+              <a:t>What</a:t>
+            </a:r>
+            <a:r>
+              <a:rPr lang="en-US" altLang="zh-CN" sz="3200" b="0" i="0" dirty="0">
+                <a:solidFill>
+                  <a:srgbClr val="202124"/>
+                </a:solidFill>
+                <a:effectLst/>
+                <a:latin typeface="Roboto"/>
+              </a:rPr>
+              <a:t> are 3 major components in Room?</a:t>
+            </a:r>
+            <a:endParaRPr lang="zh-CN" altLang="en-US" sz="3200" dirty="0"/>
+          </a:p>
+        </p:txBody>
+      </p:sp>
+    </p:spTree>
+    <p:extLst>
+      <p:ext uri="{BB962C8B-B14F-4D97-AF65-F5344CB8AC3E}">
+        <p14:creationId xmlns:p14="http://schemas.microsoft.com/office/powerpoint/2010/main" val="2863569578"/>
+      </p:ext>
+    </p:extLst>
+  </p:cSld>
+  <p:clrMapOvr>
+    <a:masterClrMapping/>
+  </p:clrMapOvr>
+</p:sld>
+</file>
+
+<file path=ppt/slides/slide19.xml><?xml version="1.0" encoding="utf-8"?>
+<p:sld xmlns:a="http://schemas.openxmlformats.org/drawingml/2006/main" xmlns:r="http://schemas.openxmlformats.org/officeDocument/2006/relationships" xmlns:p="http://schemas.openxmlformats.org/presentationml/2006/main">
+  <p:cSld>
+    <p:spTree>
+      <p:nvGrpSpPr>
+        <p:cNvPr id="1" name=""/>
+        <p:cNvGrpSpPr/>
+        <p:nvPr/>
+      </p:nvGrpSpPr>
+      <p:grpSpPr>
+        <a:xfrm>
+          <a:off x="0" y="0"/>
+          <a:ext cx="0" cy="0"/>
+          <a:chOff x="0" y="0"/>
+          <a:chExt cx="0" cy="0"/>
+        </a:xfrm>
+      </p:grpSpPr>
+      <p:sp>
+        <p:nvSpPr>
+          <p:cNvPr id="2" name="标题 1">
+            <a:extLst>
+              <a:ext uri="{FF2B5EF4-FFF2-40B4-BE49-F238E27FC236}">
                 <a16:creationId xmlns:a16="http://schemas.microsoft.com/office/drawing/2014/main" id="{6028E242-C72B-4AD7-8BC0-78D7A2635F8B}"/>
               </a:ext>
             </a:extLst>
@@ -4469,12 +5127,25 @@
             <p:ph type="title"/>
           </p:nvPr>
         </p:nvSpPr>
-        <p:spPr/>
+        <p:spPr>
+          <a:xfrm>
+            <a:off x="0" y="26488"/>
+            <a:ext cx="10515600" cy="1325563"/>
+          </a:xfrm>
+        </p:spPr>
         <p:txBody>
           <a:bodyPr/>
           <a:lstStyle/>
           <a:p>
-            <a:endParaRPr lang="zh-CN" altLang="en-US"/>
+            <a:r>
+              <a:rPr lang="en-US" altLang="zh-CN" dirty="0" err="1"/>
+              <a:t>HomeWork</a:t>
+            </a:r>
+            <a:r>
+              <a:rPr lang="en-US" altLang="zh-CN" dirty="0"/>
+              <a:t> 5: Address book</a:t>
+            </a:r>
+            <a:endParaRPr lang="zh-CN" altLang="en-US" dirty="0"/>
           </a:p>
         </p:txBody>
       </p:sp>
@@ -4494,15 +5165,123 @@
             <p:ph idx="1"/>
           </p:nvPr>
         </p:nvSpPr>
-        <p:spPr/>
+        <p:spPr>
+          <a:xfrm>
+            <a:off x="405063" y="1352051"/>
+            <a:ext cx="7391400" cy="4351338"/>
+          </a:xfrm>
+        </p:spPr>
         <p:txBody>
           <a:bodyPr/>
           <a:lstStyle/>
           <a:p>
-            <a:endParaRPr lang="zh-CN" altLang="en-US"/>
-          </a:p>
-        </p:txBody>
-      </p:sp>
+            <a:r>
+              <a:rPr lang="zh-CN" altLang="en-US" dirty="0"/>
+              <a:t>功能要求</a:t>
+            </a:r>
+            <a:endParaRPr lang="en-US" altLang="zh-CN" dirty="0"/>
+          </a:p>
+          <a:p>
+            <a:pPr lvl="1"/>
+            <a:r>
+              <a:rPr lang="zh-CN" altLang="en-US" dirty="0"/>
+              <a:t>增删改查，查询支持模糊查询</a:t>
+            </a:r>
+            <a:endParaRPr lang="en-US" altLang="zh-CN" dirty="0"/>
+          </a:p>
+          <a:p>
+            <a:pPr lvl="1"/>
+            <a:r>
+              <a:rPr lang="zh-CN" altLang="en-US" dirty="0"/>
+              <a:t>人员信息：姓名，电话号码，邮箱</a:t>
+            </a:r>
+            <a:endParaRPr lang="en-US" altLang="zh-CN" dirty="0"/>
+          </a:p>
+          <a:p>
+            <a:pPr lvl="1"/>
+            <a:r>
+              <a:rPr lang="zh-CN" altLang="en-US" dirty="0"/>
+              <a:t>录入信息有效性验证</a:t>
+            </a:r>
+            <a:endParaRPr lang="en-US" altLang="zh-CN" dirty="0"/>
+          </a:p>
+          <a:p>
+            <a:r>
+              <a:rPr lang="zh-CN" altLang="en-US" dirty="0"/>
+              <a:t>界面要求</a:t>
+            </a:r>
+            <a:endParaRPr lang="en-US" altLang="zh-CN" dirty="0"/>
+          </a:p>
+          <a:p>
+            <a:pPr lvl="1"/>
+            <a:r>
+              <a:rPr lang="zh-CN" altLang="en-US" dirty="0"/>
+              <a:t>搜索功能和联系人列表在同一屏幕</a:t>
+            </a:r>
+            <a:endParaRPr lang="en-US" altLang="zh-CN" dirty="0"/>
+          </a:p>
+          <a:p>
+            <a:pPr lvl="1"/>
+            <a:r>
+              <a:rPr lang="zh-CN" altLang="en-US" dirty="0"/>
+              <a:t>其他方面不作具体要求，可参考各自喜欢的界面</a:t>
+            </a:r>
+            <a:endParaRPr lang="en-US" altLang="zh-CN" dirty="0"/>
+          </a:p>
+          <a:p>
+            <a:r>
+              <a:rPr lang="zh-CN" altLang="en-US" dirty="0"/>
+              <a:t>提交时间：</a:t>
+            </a:r>
+            <a:r>
+              <a:rPr lang="en-US" altLang="zh-CN" dirty="0"/>
+              <a:t>2020-11-30</a:t>
+            </a:r>
+            <a:endParaRPr lang="zh-CN" altLang="en-US" dirty="0"/>
+          </a:p>
+        </p:txBody>
+      </p:sp>
+      <p:pic>
+        <p:nvPicPr>
+          <p:cNvPr id="5" name="图片 4">
+            <a:extLst>
+              <a:ext uri="{FF2B5EF4-FFF2-40B4-BE49-F238E27FC236}">
+                <a16:creationId xmlns:a16="http://schemas.microsoft.com/office/drawing/2014/main" id="{2EE90637-8275-416A-B295-A9AC46D5B73B}"/>
+              </a:ext>
+            </a:extLst>
+          </p:cNvPr>
+          <p:cNvPicPr>
+            <a:picLocks noChangeAspect="1"/>
+          </p:cNvPicPr>
+          <p:nvPr/>
+        </p:nvPicPr>
+        <p:blipFill>
+          <a:blip r:embed="rId2">
+            <a:extLst>
+              <a:ext uri="{28A0092B-C50C-407E-A947-70E740481C1C}">
+                <a14:useLocalDpi xmlns:a14="http://schemas.microsoft.com/office/drawing/2010/main" val="0"/>
+              </a:ext>
+            </a:extLst>
+          </a:blip>
+          <a:stretch>
+            <a:fillRect/>
+          </a:stretch>
+        </p:blipFill>
+        <p:spPr>
+          <a:xfrm>
+            <a:off x="8812670" y="26488"/>
+            <a:ext cx="3153006" cy="6831512"/>
+          </a:xfrm>
+          <a:prstGeom prst="rect">
+            <a:avLst/>
+          </a:prstGeom>
+          <a:ln>
+            <a:solidFill>
+              <a:schemeClr val="tx1"/>
+            </a:solidFill>
+          </a:ln>
+        </p:spPr>
+      </p:pic>
     </p:spTree>
     <p:extLst>
       <p:ext uri="{BB962C8B-B14F-4D97-AF65-F5344CB8AC3E}">
@@ -5853,7 +6632,7 @@
           <a:p>
             <a:r>
               <a:rPr lang="en-US" altLang="zh-CN" dirty="0"/>
-              <a:t>What are main differences between Internal storage  and External storage ?</a:t>
+              <a:t>What are the main differences between Internal storage  and External storage?</a:t>
             </a:r>
             <a:endParaRPr lang="zh-CN" altLang="en-US" dirty="0"/>
           </a:p>
@@ -5983,7 +6762,7 @@
         </p:nvSpPr>
         <p:spPr>
           <a:xfrm>
-            <a:off x="838198" y="2002088"/>
+            <a:off x="838199" y="1713330"/>
             <a:ext cx="10515600" cy="2387091"/>
           </a:xfrm>
         </p:spPr>
@@ -6027,7 +6806,7 @@
         </p:nvSpPr>
         <p:spPr bwMode="auto">
           <a:xfrm>
-            <a:off x="1100888" y="4414905"/>
+            <a:off x="1100888" y="4254484"/>
             <a:ext cx="9733547" cy="2215991"/>
           </a:xfrm>
           <a:prstGeom prst="rect">
@@ -6423,7 +7202,7 @@
           <p:cNvPr id="2" name="标题 1">
             <a:extLst>
               <a:ext uri="{FF2B5EF4-FFF2-40B4-BE49-F238E27FC236}">
-                <a16:creationId xmlns:a16="http://schemas.microsoft.com/office/drawing/2014/main" id="{27AD70D9-7BF4-4552-9FA7-ACBB3C616FD4}"/>
+                <a16:creationId xmlns:a16="http://schemas.microsoft.com/office/drawing/2014/main" id="{26FC3646-5D06-448D-AAFC-CBEC5B3F1985}"/>
               </a:ext>
             </a:extLst>
           </p:cNvPr>
@@ -6441,75 +7220,51 @@
           <a:p>
             <a:r>
               <a:rPr lang="en-US" altLang="zh-CN" dirty="0"/>
-              <a:t>Read </a:t>
-            </a:r>
-            <a:r>
-              <a:rPr lang="en-US" altLang="zh-CN" b="1" i="1" dirty="0"/>
-              <a:t>cache files </a:t>
-            </a:r>
+              <a:t>File path in the device</a:t>
+            </a:r>
+            <a:endParaRPr lang="zh-CN" altLang="en-US" dirty="0"/>
+          </a:p>
+        </p:txBody>
+      </p:sp>
+      <p:sp>
+        <p:nvSpPr>
+          <p:cNvPr id="3" name="内容占位符 2">
+            <a:extLst>
+              <a:ext uri="{FF2B5EF4-FFF2-40B4-BE49-F238E27FC236}">
+                <a16:creationId xmlns:a16="http://schemas.microsoft.com/office/drawing/2014/main" id="{A7CC205C-8EE6-4253-8E15-23F9C413D2E3}"/>
+              </a:ext>
+            </a:extLst>
+          </p:cNvPr>
+          <p:cNvSpPr>
+            <a:spLocks noGrp="1"/>
+          </p:cNvSpPr>
+          <p:nvPr>
+            <p:ph idx="1"/>
+          </p:nvPr>
+        </p:nvSpPr>
+        <p:spPr/>
+        <p:txBody>
+          <a:bodyPr/>
+          <a:lstStyle/>
+          <a:p>
             <a:r>
               <a:rPr lang="en-US" altLang="zh-CN" dirty="0"/>
-              <a:t>related Parts</a:t>
+              <a:t>Read Page 271</a:t>
+            </a:r>
+          </a:p>
+          <a:p>
+            <a:r>
+              <a:rPr lang="en-US" altLang="zh-CN" dirty="0"/>
+              <a:t>Where to find the output files? </a:t>
             </a:r>
             <a:endParaRPr lang="zh-CN" altLang="en-US" dirty="0"/>
-          </a:p>
-        </p:txBody>
-      </p:sp>
-      <p:sp>
-        <p:nvSpPr>
-          <p:cNvPr id="3" name="内容占位符 2">
-            <a:extLst>
-              <a:ext uri="{FF2B5EF4-FFF2-40B4-BE49-F238E27FC236}">
-                <a16:creationId xmlns:a16="http://schemas.microsoft.com/office/drawing/2014/main" id="{9756A742-7097-4F72-9470-23766E3C327A}"/>
-              </a:ext>
-            </a:extLst>
-          </p:cNvPr>
-          <p:cNvSpPr>
-            <a:spLocks noGrp="1"/>
-          </p:cNvSpPr>
-          <p:nvPr>
-            <p:ph idx="1"/>
-          </p:nvPr>
-        </p:nvSpPr>
-        <p:spPr/>
-        <p:txBody>
-          <a:bodyPr>
-            <a:normAutofit/>
-          </a:bodyPr>
-          <a:lstStyle/>
-          <a:p>
-            <a:r>
-              <a:rPr lang="en-US" altLang="zh-CN" sz="3200" dirty="0"/>
-              <a:t>When to used cache files?</a:t>
-            </a:r>
-          </a:p>
-          <a:p>
-            <a:r>
-              <a:rPr lang="en-US" altLang="zh-CN" sz="3200" dirty="0"/>
-              <a:t>What are differences between cache files  and  persistent files?</a:t>
-            </a:r>
-          </a:p>
-          <a:p>
-            <a:r>
-              <a:rPr lang="en-US" altLang="zh-CN" sz="3200" dirty="0"/>
-              <a:t>How can </a:t>
-            </a:r>
-            <a:r>
-              <a:rPr lang="en-US" altLang="zh-CN" sz="3200" dirty="0" err="1"/>
-              <a:t>getCacheQuotaBytes</a:t>
-            </a:r>
-            <a:r>
-              <a:rPr lang="en-US" altLang="zh-CN" sz="3200" dirty="0"/>
-              <a:t>() help to use cache files?</a:t>
-            </a:r>
-            <a:endParaRPr lang="zh-CN" altLang="en-US" sz="3200" dirty="0"/>
           </a:p>
         </p:txBody>
       </p:sp>
     </p:spTree>
     <p:extLst>
       <p:ext uri="{BB962C8B-B14F-4D97-AF65-F5344CB8AC3E}">
-        <p14:creationId xmlns:p14="http://schemas.microsoft.com/office/powerpoint/2010/main" val="4177412320"/>
+        <p14:creationId xmlns:p14="http://schemas.microsoft.com/office/powerpoint/2010/main" val="1363502023"/>
       </p:ext>
     </p:extLst>
   </p:cSld>
@@ -6541,7 +7296,7 @@
           <p:cNvPr id="2" name="标题 1">
             <a:extLst>
               <a:ext uri="{FF2B5EF4-FFF2-40B4-BE49-F238E27FC236}">
-                <a16:creationId xmlns:a16="http://schemas.microsoft.com/office/drawing/2014/main" id="{8994C621-E6A7-4011-A25A-37221CBF432A}"/>
+                <a16:creationId xmlns:a16="http://schemas.microsoft.com/office/drawing/2014/main" id="{27AD70D9-7BF4-4552-9FA7-ACBB3C616FD4}"/>
               </a:ext>
             </a:extLst>
           </p:cNvPr>
@@ -6559,13 +7314,17 @@
           <a:p>
             <a:r>
               <a:rPr lang="en-US" altLang="zh-CN" dirty="0"/>
-              <a:t>Read Part </a:t>
+              <a:t>Read </a:t>
             </a:r>
             <a:r>
               <a:rPr lang="en-US" altLang="zh-CN" b="1" i="1" dirty="0"/>
-              <a:t>Access from external storage</a:t>
-            </a:r>
-            <a:endParaRPr lang="zh-CN" altLang="en-US" b="1" i="1" dirty="0"/>
+              <a:t>cache files </a:t>
+            </a:r>
+            <a:r>
+              <a:rPr lang="en-US" altLang="zh-CN" dirty="0"/>
+              <a:t>related Parts</a:t>
+            </a:r>
+            <a:endParaRPr lang="zh-CN" altLang="en-US" dirty="0"/>
           </a:p>
         </p:txBody>
       </p:sp>
@@ -6574,7 +7333,7 @@
           <p:cNvPr id="3" name="内容占位符 2">
             <a:extLst>
               <a:ext uri="{FF2B5EF4-FFF2-40B4-BE49-F238E27FC236}">
-                <a16:creationId xmlns:a16="http://schemas.microsoft.com/office/drawing/2014/main" id="{6238C2A2-604C-40AE-93FC-508E0FBA7DAF}"/>
+                <a16:creationId xmlns:a16="http://schemas.microsoft.com/office/drawing/2014/main" id="{9756A742-7097-4F72-9470-23766E3C327A}"/>
               </a:ext>
             </a:extLst>
           </p:cNvPr>
@@ -6594,13 +7353,27 @@
           <a:p>
             <a:r>
               <a:rPr lang="en-US" altLang="zh-CN" sz="3200" dirty="0"/>
-              <a:t>Give some examples of external storage</a:t>
+              <a:t>When to used cache files?</a:t>
             </a:r>
           </a:p>
           <a:p>
             <a:r>
               <a:rPr lang="en-US" altLang="zh-CN" sz="3200" dirty="0"/>
-              <a:t>The most important thing before using external storage?</a:t>
+              <a:t>What are differences between cache files  and  persistent files?</a:t>
+            </a:r>
+          </a:p>
+          <a:p>
+            <a:r>
+              <a:rPr lang="en-US" altLang="zh-CN" sz="3200" dirty="0"/>
+              <a:t>How can </a:t>
+            </a:r>
+            <a:r>
+              <a:rPr lang="en-US" altLang="zh-CN" sz="3200" dirty="0" err="1"/>
+              <a:t>getCacheQuotaBytes</a:t>
+            </a:r>
+            <a:r>
+              <a:rPr lang="en-US" altLang="zh-CN" sz="3200" dirty="0"/>
+              <a:t>() help in using cache files?</a:t>
             </a:r>
             <a:endParaRPr lang="zh-CN" altLang="en-US" sz="3200" dirty="0"/>
           </a:p>
@@ -6609,7 +7382,7 @@
     </p:spTree>
     <p:extLst>
       <p:ext uri="{BB962C8B-B14F-4D97-AF65-F5344CB8AC3E}">
-        <p14:creationId xmlns:p14="http://schemas.microsoft.com/office/powerpoint/2010/main" val="985624583"/>
+        <p14:creationId xmlns:p14="http://schemas.microsoft.com/office/powerpoint/2010/main" val="4177412320"/>
       </p:ext>
     </p:extLst>
   </p:cSld>
@@ -6641,7 +7414,7 @@
           <p:cNvPr id="2" name="标题 1">
             <a:extLst>
               <a:ext uri="{FF2B5EF4-FFF2-40B4-BE49-F238E27FC236}">
-                <a16:creationId xmlns:a16="http://schemas.microsoft.com/office/drawing/2014/main" id="{E6288637-6326-44AE-AB70-CAEB2C45315F}"/>
+                <a16:creationId xmlns:a16="http://schemas.microsoft.com/office/drawing/2014/main" id="{8994C621-E6A7-4011-A25A-37221CBF432A}"/>
               </a:ext>
             </a:extLst>
           </p:cNvPr>
@@ -6652,118 +7425,64 @@
             <p:ph type="title"/>
           </p:nvPr>
         </p:nvSpPr>
-        <p:spPr>
-          <a:xfrm>
-            <a:off x="838200" y="365125"/>
-            <a:ext cx="10515600" cy="581359"/>
-          </a:xfrm>
-        </p:spPr>
+        <p:spPr/>
+        <p:txBody>
+          <a:bodyPr/>
+          <a:lstStyle/>
+          <a:p>
+            <a:r>
+              <a:rPr lang="en-US" altLang="zh-CN" dirty="0"/>
+              <a:t>Read Part </a:t>
+            </a:r>
+            <a:r>
+              <a:rPr lang="en-US" altLang="zh-CN" b="1" i="1" dirty="0"/>
+              <a:t>Access from external storage</a:t>
+            </a:r>
+            <a:endParaRPr lang="zh-CN" altLang="en-US" b="1" i="1" dirty="0"/>
+          </a:p>
+        </p:txBody>
+      </p:sp>
+      <p:sp>
+        <p:nvSpPr>
+          <p:cNvPr id="3" name="内容占位符 2">
+            <a:extLst>
+              <a:ext uri="{FF2B5EF4-FFF2-40B4-BE49-F238E27FC236}">
+                <a16:creationId xmlns:a16="http://schemas.microsoft.com/office/drawing/2014/main" id="{6238C2A2-604C-40AE-93FC-508E0FBA7DAF}"/>
+              </a:ext>
+            </a:extLst>
+          </p:cNvPr>
+          <p:cNvSpPr>
+            <a:spLocks noGrp="1"/>
+          </p:cNvSpPr>
+          <p:nvPr>
+            <p:ph idx="1"/>
+          </p:nvPr>
+        </p:nvSpPr>
+        <p:spPr/>
         <p:txBody>
           <a:bodyPr>
-            <a:normAutofit fontScale="90000"/>
+            <a:normAutofit/>
           </a:bodyPr>
           <a:lstStyle/>
           <a:p>
             <a:r>
-              <a:rPr lang="en-US" altLang="zh-CN" dirty="0"/>
-              <a:t>Save key-value data</a:t>
-            </a:r>
-            <a:endParaRPr lang="zh-CN" altLang="en-US" dirty="0"/>
-          </a:p>
-        </p:txBody>
-      </p:sp>
-      <p:sp>
-        <p:nvSpPr>
-          <p:cNvPr id="3" name="内容占位符 2">
-            <a:extLst>
-              <a:ext uri="{FF2B5EF4-FFF2-40B4-BE49-F238E27FC236}">
-                <a16:creationId xmlns:a16="http://schemas.microsoft.com/office/drawing/2014/main" id="{BCAC5A93-DE34-4FF2-9154-CF2613899638}"/>
-              </a:ext>
-            </a:extLst>
-          </p:cNvPr>
-          <p:cNvSpPr>
-            <a:spLocks noGrp="1"/>
-          </p:cNvSpPr>
-          <p:nvPr>
-            <p:ph idx="1"/>
-          </p:nvPr>
-        </p:nvSpPr>
-        <p:spPr/>
-        <p:txBody>
-          <a:bodyPr/>
-          <a:lstStyle/>
-          <a:p>
-            <a:r>
-              <a:rPr lang="en-US" altLang="zh-CN" dirty="0"/>
-              <a:t>If you have a relatively small collection of key-values that you'd like to save, you should use the </a:t>
-            </a:r>
-            <a:r>
-              <a:rPr lang="en-US" altLang="zh-CN" dirty="0" err="1"/>
-              <a:t>SharedPreferences</a:t>
-            </a:r>
-            <a:r>
-              <a:rPr lang="en-US" altLang="zh-CN" dirty="0"/>
-              <a:t> APIs.</a:t>
-            </a:r>
-          </a:p>
-          <a:p>
-            <a:r>
-              <a:rPr lang="en-US" altLang="zh-CN" dirty="0" err="1"/>
-              <a:t>SharedPreferences</a:t>
-            </a:r>
-            <a:r>
-              <a:rPr lang="en-US" altLang="zh-CN" dirty="0"/>
-              <a:t> file can be private?</a:t>
-            </a:r>
-          </a:p>
-          <a:p>
-            <a:r>
-              <a:rPr lang="en-US" altLang="zh-CN" dirty="0"/>
-              <a:t>Is it the same as Preference APIs?</a:t>
-            </a:r>
-            <a:endParaRPr lang="zh-CN" altLang="en-US" dirty="0"/>
-          </a:p>
-        </p:txBody>
-      </p:sp>
-      <p:sp>
-        <p:nvSpPr>
-          <p:cNvPr id="5" name="文本框 4">
-            <a:extLst>
-              <a:ext uri="{FF2B5EF4-FFF2-40B4-BE49-F238E27FC236}">
-                <a16:creationId xmlns:a16="http://schemas.microsoft.com/office/drawing/2014/main" id="{6215AD41-0B79-465E-AD29-0584BDA1784E}"/>
-              </a:ext>
-            </a:extLst>
-          </p:cNvPr>
-          <p:cNvSpPr txBox="1"/>
-          <p:nvPr/>
-        </p:nvSpPr>
-        <p:spPr>
-          <a:xfrm>
-            <a:off x="838200" y="1123138"/>
-            <a:ext cx="10856496" cy="461665"/>
-          </a:xfrm>
-          <a:prstGeom prst="rect">
-            <a:avLst/>
-          </a:prstGeom>
-          <a:noFill/>
-        </p:spPr>
-        <p:txBody>
-          <a:bodyPr wrap="square">
-            <a:spAutoFit/>
-          </a:bodyPr>
-          <a:lstStyle/>
-          <a:p>
-            <a:r>
-              <a:rPr lang="zh-CN" altLang="en-US" sz="2400" dirty="0"/>
-              <a:t>https://developer.android.google.cn/training/data-storage/shared-preferences</a:t>
-            </a:r>
+              <a:rPr lang="en-US" altLang="zh-CN" sz="3200" dirty="0"/>
+              <a:t>Give some examples of external storage device</a:t>
+            </a:r>
+          </a:p>
+          <a:p>
+            <a:r>
+              <a:rPr lang="en-US" altLang="zh-CN" sz="3200" dirty="0"/>
+              <a:t>The most important thing before using external storage?</a:t>
+            </a:r>
+            <a:endParaRPr lang="zh-CN" altLang="en-US" sz="3200" dirty="0"/>
           </a:p>
         </p:txBody>
       </p:sp>
     </p:spTree>
     <p:extLst>
       <p:ext uri="{BB962C8B-B14F-4D97-AF65-F5344CB8AC3E}">
-        <p14:creationId xmlns:p14="http://schemas.microsoft.com/office/powerpoint/2010/main" val="1002890248"/>
+        <p14:creationId xmlns:p14="http://schemas.microsoft.com/office/powerpoint/2010/main" val="985624583"/>
       </p:ext>
     </p:extLst>
   </p:cSld>

</xml_diff>

<commit_message>
fix: Android Advanced UI.pptx
</commit_message>
<xml_diff>
--- a/Android data & files.pptx
+++ b/Android data & files.pptx
@@ -4876,6 +4876,50 @@
             <a:r>
               <a:rPr lang="en-US" altLang="zh-CN" sz="2800" dirty="0"/>
               <a:t>SQLite can we do?</a:t>
+            </a:r>
+          </a:p>
+          <a:p>
+            <a:r>
+              <a:rPr lang="en-US" altLang="zh-CN" dirty="0"/>
+              <a:t>To use </a:t>
+            </a:r>
+            <a:r>
+              <a:rPr lang="en-US" altLang="zh-CN" dirty="0" err="1"/>
+              <a:t>SQLiteOpenHelper</a:t>
+            </a:r>
+            <a:r>
+              <a:rPr lang="en-US" altLang="zh-CN" dirty="0"/>
+              <a:t>, Which callbacks to be </a:t>
+            </a:r>
+            <a:r>
+              <a:rPr lang="en-US" altLang="zh-CN" dirty="0" err="1"/>
+              <a:t>overridesd</a:t>
+            </a:r>
+            <a:r>
+              <a:rPr lang="en-US" altLang="zh-CN" dirty="0"/>
+              <a:t> in creating a subclass?</a:t>
+            </a:r>
+          </a:p>
+          <a:p>
+            <a:r>
+              <a:rPr lang="en-US" altLang="zh-CN" dirty="0"/>
+              <a:t>When to use </a:t>
+            </a:r>
+            <a:r>
+              <a:rPr lang="en-US" altLang="zh-CN" dirty="0" err="1"/>
+              <a:t>getWritableDatabase</a:t>
+            </a:r>
+            <a:r>
+              <a:rPr lang="en-US" altLang="zh-CN" dirty="0"/>
+              <a:t>() or </a:t>
+            </a:r>
+            <a:r>
+              <a:rPr lang="en-US" altLang="zh-CN" dirty="0" err="1"/>
+              <a:t>getReadableDatabase</a:t>
+            </a:r>
+            <a:r>
+              <a:rPr lang="en-US" altLang="zh-CN" dirty="0"/>
+              <a:t>()? Give brief reasons.</a:t>
             </a:r>
             <a:endParaRPr lang="zh-CN" altLang="en-US" dirty="0"/>
           </a:p>

</xml_diff>